<commit_message>
0428,update meeting slide, corpus report, iris report, README
</commit_message>
<xml_diff>
--- a/Weekly Meeting/0421Meeting.pptx
+++ b/Weekly Meeting/0421Meeting.pptx
@@ -4397,7 +4397,12 @@
             <p:ph type="title"/>
           </p:nvPr>
         </p:nvSpPr>
-        <p:spPr/>
+        <p:spPr>
+          <a:xfrm>
+            <a:off x="838200" y="344170"/>
+            <a:ext cx="10515600" cy="1325563"/>
+          </a:xfrm>
+        </p:spPr>
         <p:txBody>
           <a:bodyPr/>
           <a:p>
@@ -4421,12 +4426,14 @@
         </p:nvSpPr>
         <p:spPr>
           <a:xfrm>
-            <a:off x="838200" y="1783715"/>
-            <a:ext cx="10515600" cy="4881245"/>
-          </a:xfrm>
-        </p:spPr>
-        <p:txBody>
-          <a:bodyPr/>
+            <a:off x="781050" y="1525905"/>
+            <a:ext cx="10515600" cy="5103495"/>
+          </a:xfrm>
+        </p:spPr>
+        <p:txBody>
+          <a:bodyPr>
+            <a:normAutofit lnSpcReduction="20000"/>
+          </a:bodyPr>
           <a:p>
             <a:pPr marL="0" indent="0">
               <a:buNone/>
@@ -4513,6 +4520,46 @@
             </a:pPr>
             <a:r>
               <a:rPr lang="zh-CN" altLang="en-US"/>
+              <a:t>看一下求的是誰的</a:t>
+            </a:r>
+            <a:r>
+              <a:rPr lang="zh-CN" altLang="en-US"/>
+              <a:t>特征值</a:t>
+            </a:r>
+            <a:endParaRPr lang="zh-CN" altLang="en-US"/>
+          </a:p>
+          <a:p>
+            <a:pPr marL="0" indent="0">
+              <a:buNone/>
+            </a:pPr>
+            <a:r>
+              <a:rPr lang="en-US" altLang="zh-CN"/>
+              <a:t>scale</a:t>
+            </a:r>
+            <a:r>
+              <a:rPr lang="zh-CN" altLang="en-US"/>
+              <a:t>完之後再比各種</a:t>
+            </a:r>
+            <a:r>
+              <a:rPr lang="en-US" altLang="zh-CN"/>
+              <a:t>tt</a:t>
+            </a:r>
+            <a:r>
+              <a:rPr lang="zh-CN" altLang="en-US"/>
+              <a:t>的</a:t>
+            </a:r>
+            <a:r>
+              <a:rPr lang="zh-CN" altLang="en-US"/>
+              <a:t>取值</a:t>
+            </a:r>
+            <a:endParaRPr lang="zh-CN" altLang="en-US"/>
+          </a:p>
+          <a:p>
+            <a:pPr marL="0" indent="0">
+              <a:buNone/>
+            </a:pPr>
+            <a:r>
+              <a:rPr lang="zh-CN" altLang="en-US"/>
               <a:t>怎樣避免</a:t>
             </a:r>
             <a:r>
@@ -4567,7 +4614,7 @@
               <a:rPr lang="zh-CN" altLang="en-US"/>
               <a:t>失敗？</a:t>
             </a:r>
-            <a:endParaRPr lang="en-US" altLang="zh-CN"/>
+            <a:endParaRPr lang="zh-CN" altLang="en-US"/>
           </a:p>
           <a:p>
             <a:pPr marL="0" indent="0">
@@ -4772,7 +4819,7 @@
         </p:blipFill>
         <p:spPr>
           <a:xfrm>
-            <a:off x="3648075" y="-43497"/>
+            <a:off x="1967865" y="50483"/>
             <a:ext cx="5274310" cy="3841115"/>
           </a:xfrm>
           <a:prstGeom prst="rect">
@@ -4832,7 +4879,7 @@
         </p:blipFill>
         <p:spPr>
           <a:xfrm>
-            <a:off x="6917690" y="3601403"/>
+            <a:off x="6418580" y="3582353"/>
             <a:ext cx="5274310" cy="3188335"/>
           </a:xfrm>
           <a:prstGeom prst="rect">
@@ -4850,7 +4897,12 @@
             <p:ph type="title"/>
           </p:nvPr>
         </p:nvSpPr>
-        <p:spPr/>
+        <p:spPr>
+          <a:xfrm>
+            <a:off x="1337310" y="263525"/>
+            <a:ext cx="10515600" cy="1325563"/>
+          </a:xfrm>
+        </p:spPr>
         <p:txBody>
           <a:bodyPr/>
           <a:p>
@@ -4880,7 +4932,7 @@
         </p:spPr>
         <p:txBody>
           <a:bodyPr>
-            <a:normAutofit fontScale="80000"/>
+            <a:normAutofit fontScale="90000"/>
           </a:bodyPr>
           <a:p>
             <a:pPr marL="0" indent="0">
@@ -4897,15 +4949,6 @@
               <a:rPr lang="zh-CN" altLang="en-US"/>
               <a:t>數據集</a:t>
             </a:r>
-            <a:endParaRPr lang="zh-CN" altLang="en-US"/>
-          </a:p>
-          <a:p>
-            <a:pPr marL="0" indent="0">
-              <a:lnSpc>
-                <a:spcPct val="100000"/>
-              </a:lnSpc>
-              <a:buNone/>
-            </a:pPr>
             <a:endParaRPr lang="zh-CN" altLang="en-US"/>
           </a:p>
           <a:p>
@@ -5162,7 +5205,7 @@
         </p:blipFill>
         <p:spPr>
           <a:xfrm>
-            <a:off x="6095683" y="190500"/>
+            <a:off x="6732588" y="365125"/>
             <a:ext cx="4319905" cy="2713990"/>
           </a:xfrm>
           <a:prstGeom prst="rect">
@@ -5190,7 +5233,7 @@
         </p:blipFill>
         <p:spPr>
           <a:xfrm>
-            <a:off x="4122420" y="3562985"/>
+            <a:off x="4280535" y="3696335"/>
             <a:ext cx="7720443" cy="2880000"/>
           </a:xfrm>
           <a:prstGeom prst="rect">

</xml_diff>